<commit_message>
Minor formatting and graphics fixes
</commit_message>
<xml_diff>
--- a/Logo.pptx
+++ b/Logo.pptx
@@ -3111,12 +3111,12 @@
           </a:prstGeom>
           <a:gradFill flip="none" rotWithShape="1">
             <a:gsLst>
-              <a:gs pos="0">
+              <a:gs pos="92000">
                 <a:schemeClr val="bg2">
-                  <a:lumMod val="75000"/>
+                  <a:lumMod val="90000"/>
                 </a:schemeClr>
               </a:gs>
-              <a:gs pos="100000">
+              <a:gs pos="11000">
                 <a:schemeClr val="bg1"/>
               </a:gs>
             </a:gsLst>

</xml_diff>